<commit_message>
compatibility with negmas 0.9
</commit_message>
<xml_diff>
--- a/notebooks/tutorials/world.pptx
+++ b/notebooks/tutorials/world.pptx
@@ -104,6 +104,11 @@
       </a:defRPr>
     </a:lvl9pPr>
   </p:defaultTextStyle>
+  <p:extLst>
+    <p:ext uri="{EFAFB233-063F-42B5-8137-9DF3F51BA10A}">
+      <p15:sldGuideLst xmlns:p15="http://schemas.microsoft.com/office/powerpoint/2012/main"/>
+    </p:ext>
+  </p:extLst>
 </p:presentation>
 </file>
 
@@ -238,7 +243,7 @@
           <a:p>
             <a:fld id="{C3EE8A16-5F91-9A4F-BD3D-A42039A07D42}" type="datetimeFigureOut">
               <a:rPr lang="en-JP" smtClean="0"/>
-              <a:t>2021/03/14</a:t>
+              <a:t>2022/02/02</a:t>
             </a:fld>
             <a:endParaRPr lang="en-JP"/>
           </a:p>
@@ -408,7 +413,7 @@
           <a:p>
             <a:fld id="{C3EE8A16-5F91-9A4F-BD3D-A42039A07D42}" type="datetimeFigureOut">
               <a:rPr lang="en-JP" smtClean="0"/>
-              <a:t>2021/03/14</a:t>
+              <a:t>2022/02/02</a:t>
             </a:fld>
             <a:endParaRPr lang="en-JP"/>
           </a:p>
@@ -588,7 +593,7 @@
           <a:p>
             <a:fld id="{C3EE8A16-5F91-9A4F-BD3D-A42039A07D42}" type="datetimeFigureOut">
               <a:rPr lang="en-JP" smtClean="0"/>
-              <a:t>2021/03/14</a:t>
+              <a:t>2022/02/02</a:t>
             </a:fld>
             <a:endParaRPr lang="en-JP"/>
           </a:p>
@@ -758,7 +763,7 @@
           <a:p>
             <a:fld id="{C3EE8A16-5F91-9A4F-BD3D-A42039A07D42}" type="datetimeFigureOut">
               <a:rPr lang="en-JP" smtClean="0"/>
-              <a:t>2021/03/14</a:t>
+              <a:t>2022/02/02</a:t>
             </a:fld>
             <a:endParaRPr lang="en-JP"/>
           </a:p>
@@ -1004,7 +1009,7 @@
           <a:p>
             <a:fld id="{C3EE8A16-5F91-9A4F-BD3D-A42039A07D42}" type="datetimeFigureOut">
               <a:rPr lang="en-JP" smtClean="0"/>
-              <a:t>2021/03/14</a:t>
+              <a:t>2022/02/02</a:t>
             </a:fld>
             <a:endParaRPr lang="en-JP"/>
           </a:p>
@@ -1236,7 +1241,7 @@
           <a:p>
             <a:fld id="{C3EE8A16-5F91-9A4F-BD3D-A42039A07D42}" type="datetimeFigureOut">
               <a:rPr lang="en-JP" smtClean="0"/>
-              <a:t>2021/03/14</a:t>
+              <a:t>2022/02/02</a:t>
             </a:fld>
             <a:endParaRPr lang="en-JP"/>
           </a:p>
@@ -1603,7 +1608,7 @@
           <a:p>
             <a:fld id="{C3EE8A16-5F91-9A4F-BD3D-A42039A07D42}" type="datetimeFigureOut">
               <a:rPr lang="en-JP" smtClean="0"/>
-              <a:t>2021/03/14</a:t>
+              <a:t>2022/02/02</a:t>
             </a:fld>
             <a:endParaRPr lang="en-JP"/>
           </a:p>
@@ -1721,7 +1726,7 @@
           <a:p>
             <a:fld id="{C3EE8A16-5F91-9A4F-BD3D-A42039A07D42}" type="datetimeFigureOut">
               <a:rPr lang="en-JP" smtClean="0"/>
-              <a:t>2021/03/14</a:t>
+              <a:t>2022/02/02</a:t>
             </a:fld>
             <a:endParaRPr lang="en-JP"/>
           </a:p>
@@ -1816,7 +1821,7 @@
           <a:p>
             <a:fld id="{C3EE8A16-5F91-9A4F-BD3D-A42039A07D42}" type="datetimeFigureOut">
               <a:rPr lang="en-JP" smtClean="0"/>
-              <a:t>2021/03/14</a:t>
+              <a:t>2022/02/02</a:t>
             </a:fld>
             <a:endParaRPr lang="en-JP"/>
           </a:p>
@@ -2093,7 +2098,7 @@
           <a:p>
             <a:fld id="{C3EE8A16-5F91-9A4F-BD3D-A42039A07D42}" type="datetimeFigureOut">
               <a:rPr lang="en-JP" smtClean="0"/>
-              <a:t>2021/03/14</a:t>
+              <a:t>2022/02/02</a:t>
             </a:fld>
             <a:endParaRPr lang="en-JP"/>
           </a:p>
@@ -2350,7 +2355,7 @@
           <a:p>
             <a:fld id="{C3EE8A16-5F91-9A4F-BD3D-A42039A07D42}" type="datetimeFigureOut">
               <a:rPr lang="en-JP" smtClean="0"/>
-              <a:t>2021/03/14</a:t>
+              <a:t>2022/02/02</a:t>
             </a:fld>
             <a:endParaRPr lang="en-JP"/>
           </a:p>
@@ -2563,7 +2568,7 @@
           <a:p>
             <a:fld id="{C3EE8A16-5F91-9A4F-BD3D-A42039A07D42}" type="datetimeFigureOut">
               <a:rPr lang="en-JP" smtClean="0"/>
-              <a:t>2021/03/14</a:t>
+              <a:t>2022/02/02</a:t>
             </a:fld>
             <a:endParaRPr lang="en-JP"/>
           </a:p>
@@ -3695,7 +3700,7 @@
         <p:spPr>
           <a:xfrm>
             <a:off x="6445594" y="3227811"/>
-            <a:ext cx="352017" cy="276997"/>
+            <a:ext cx="361635" cy="276997"/>
           </a:xfrm>
           <a:prstGeom prst="rect">
             <a:avLst/>
@@ -3734,7 +3739,7 @@
                 </a:solidFill>
                 <a:sym typeface="メイリオ"/>
               </a:rPr>
-              <a:t>AMI</a:t>
+              <a:t>NMI</a:t>
             </a:r>
             <a:endParaRPr lang="en-JP" dirty="0">
               <a:solidFill>
@@ -3760,7 +3765,7 @@
         <p:spPr>
           <a:xfrm>
             <a:off x="3719206" y="3227811"/>
-            <a:ext cx="352017" cy="276997"/>
+            <a:ext cx="361635" cy="276997"/>
           </a:xfrm>
           <a:prstGeom prst="rect">
             <a:avLst/>
@@ -3799,7 +3804,7 @@
                 </a:solidFill>
                 <a:sym typeface="メイリオ"/>
               </a:rPr>
-              <a:t>AMI</a:t>
+              <a:t>NMI</a:t>
             </a:r>
             <a:endParaRPr lang="en-JP" dirty="0">
               <a:solidFill>
@@ -4347,7 +4352,7 @@
         <p:spPr>
           <a:xfrm>
             <a:off x="484350" y="3197330"/>
-            <a:ext cx="352017" cy="276997"/>
+            <a:ext cx="361635" cy="276997"/>
           </a:xfrm>
           <a:prstGeom prst="rect">
             <a:avLst/>
@@ -4386,7 +4391,7 @@
                 </a:solidFill>
                 <a:sym typeface="メイリオ"/>
               </a:rPr>
-              <a:t>AMI</a:t>
+              <a:t>NMI</a:t>
             </a:r>
             <a:endParaRPr lang="en-JP" dirty="0">
               <a:solidFill>
@@ -4732,7 +4737,7 @@
         <p:spPr>
           <a:xfrm>
             <a:off x="2101778" y="3224979"/>
-            <a:ext cx="352017" cy="276997"/>
+            <a:ext cx="361635" cy="276997"/>
           </a:xfrm>
           <a:prstGeom prst="rect">
             <a:avLst/>
@@ -4771,7 +4776,7 @@
                 </a:solidFill>
                 <a:sym typeface="メイリオ"/>
               </a:rPr>
-              <a:t>AMI</a:t>
+              <a:t>NMI</a:t>
             </a:r>
             <a:endParaRPr lang="en-JP" dirty="0">
               <a:solidFill>

</xml_diff>